<commit_message>
Updated R-Code and slides for Termin 5.
</commit_message>
<xml_diff>
--- a/Termin_5/folien/UebungModellierung#5.pptx
+++ b/Termin_5/folien/UebungModellierung#5.pptx
@@ -16417,7 +16417,33 @@
                   <a:effectLst/>
                   <a:latin typeface="Calibri" pitchFamily="34" charset="0"/>
                 </a:rPr>
-                <a:t>Si = x </a:t>
+                <a:t>S</a:t>
+              </a:r>
+              <a:r>
+                <a:rPr kumimoji="0" lang="de-DE" sz="1800" b="0" i="1" u="none" strike="noStrike" cap="none" normalizeH="0" baseline="-25000" dirty="0" smtClean="0">
+                  <a:ln>
+                    <a:noFill/>
+                  </a:ln>
+                  <a:solidFill>
+                    <a:schemeClr val="tx1"/>
+                  </a:solidFill>
+                  <a:effectLst/>
+                  <a:latin typeface="Calibri" pitchFamily="34" charset="0"/>
+                </a:rPr>
+                <a:t>i </a:t>
+              </a:r>
+              <a:r>
+                <a:rPr kumimoji="0" lang="de-DE" sz="1800" b="0" i="1" u="none" strike="noStrike" cap="none" normalizeH="0" dirty="0" smtClean="0">
+                  <a:ln>
+                    <a:noFill/>
+                  </a:ln>
+                  <a:solidFill>
+                    <a:schemeClr val="tx1"/>
+                  </a:solidFill>
+                  <a:effectLst/>
+                  <a:latin typeface="Calibri" pitchFamily="34" charset="0"/>
+                </a:rPr>
+                <a:t>= x </a:t>
               </a:r>
               <a:r>
                 <a:rPr kumimoji="0" lang="de-DE" sz="1800" b="0" i="1" u="none" strike="noStrike" cap="none" normalizeH="0" baseline="30000" dirty="0" smtClean="0">
@@ -16843,7 +16869,8 @@
                 <a:solidFill>
                   <a:srgbClr val="3366FF"/>
                 </a:solidFill>
-                <a:latin typeface="Calibri" pitchFamily="34" charset="0"/>
+                <a:latin typeface="Courier New" pitchFamily="49" charset="0"/>
+                <a:cs typeface="Courier New" pitchFamily="49" charset="0"/>
               </a:rPr>
               <a:t>b</a:t>
             </a:r>
@@ -18174,11 +18201,7 @@
                                           </p:stCondLst>
                                         </p:cTn>
                                         <p:tgtEl>
-                                          <p:spTgt spid="63">
-                                            <p:txEl>
-                                              <p:pRg st="0" end="0"/>
-                                            </p:txEl>
-                                          </p:spTgt>
+                                          <p:spTgt spid="63"/>
                                         </p:tgtEl>
                                         <p:attrNameLst>
                                           <p:attrName>style.visibility</p:attrName>
@@ -18192,11 +18215,7 @@
                                       <p:cBhvr>
                                         <p:cTn id="12" dur="500"/>
                                         <p:tgtEl>
-                                          <p:spTgt spid="63">
-                                            <p:txEl>
-                                              <p:pRg st="0" end="0"/>
-                                            </p:txEl>
-                                          </p:spTgt>
+                                          <p:spTgt spid="63"/>
                                         </p:tgtEl>
                                       </p:cBhvr>
                                     </p:animEffect>
@@ -18479,7 +18498,7 @@
     </p:tnLst>
     <p:bldLst>
       <p:bldP spid="61" grpId="0"/>
-      <p:bldP spid="63" grpId="0" build="p" bldLvl="2"/>
+      <p:bldP spid="63" grpId="0"/>
       <p:bldP spid="78" grpId="0" animBg="1"/>
       <p:bldP spid="85" grpId="0"/>
     </p:bldLst>
@@ -23552,12 +23571,12 @@
           <p:nvPr/>
         </p:nvGraphicFramePr>
         <p:xfrm>
-          <a:off x="4449660" y="5129436"/>
-          <a:ext cx="1746250" cy="531812"/>
+          <a:off x="4823296" y="5220882"/>
+          <a:ext cx="2413000" cy="309562"/>
         </p:xfrm>
         <a:graphic>
           <a:graphicData uri="http://schemas.openxmlformats.org/presentationml/2006/ole">
-            <p:oleObj spid="_x0000_s94214" name="Formel" r:id="rId8" imgW="1295280" imgH="393480" progId="Equation.3">
+            <p:oleObj spid="_x0000_s94214" name="Formel" r:id="rId8" imgW="1790640" imgH="228600" progId="Equation.3">
               <p:embed/>
             </p:oleObj>
           </a:graphicData>
@@ -26858,17 +26877,8 @@
               <a:rPr lang="de-DE" sz="2400" dirty="0" smtClean="0">
                 <a:latin typeface="Calibri" pitchFamily="34" charset="0"/>
               </a:rPr>
-              <a:t>R als Werkzeug in der </a:t>
-            </a:r>
-            <a:r>
-              <a:rPr lang="de-DE" sz="2400" dirty="0" smtClean="0">
-                <a:latin typeface="Calibri" pitchFamily="34" charset="0"/>
-              </a:rPr>
-              <a:t>Modellierung </a:t>
-            </a:r>
-            <a:endParaRPr lang="de-DE" sz="2400" dirty="0" smtClean="0">
-              <a:latin typeface="Calibri" pitchFamily="34" charset="0"/>
-            </a:endParaRPr>
+              <a:t>R als Werkzeug in der Modellierung </a:t>
+            </a:r>
           </a:p>
           <a:p>
             <a:pPr marL="269875" indent="-269875" algn="ctr">
@@ -26880,13 +26890,7 @@
               <a:rPr lang="de-DE" sz="2400" dirty="0" smtClean="0">
                 <a:latin typeface="Calibri" pitchFamily="34" charset="0"/>
               </a:rPr>
-              <a:t>Ökologische </a:t>
-            </a:r>
-            <a:r>
-              <a:rPr lang="de-DE" sz="2400" dirty="0" smtClean="0">
-                <a:latin typeface="Calibri" pitchFamily="34" charset="0"/>
-              </a:rPr>
-              <a:t>Modelle</a:t>
+              <a:t>Ökologische Modelle</a:t>
             </a:r>
           </a:p>
           <a:p>
@@ -32904,7 +32908,7 @@
         </p:nvSpPr>
         <p:spPr>
           <a:xfrm>
-            <a:off x="474140" y="2708627"/>
+            <a:off x="474140" y="2718355"/>
             <a:ext cx="288000" cy="1354217"/>
           </a:xfrm>
           <a:prstGeom prst="rect">
@@ -32937,25 +32941,25 @@
             </a:r>
           </a:p>
           <a:p>
-            <a:pPr marL="355600" indent="-355600">
+            <a:pPr marL="355600" indent="-355600" algn="ctr">
               <a:spcAft>
                 <a:spcPts val="600"/>
               </a:spcAft>
             </a:pPr>
             <a:r>
               <a:rPr lang="de-DE" sz="2400" dirty="0" smtClean="0">
+                <a:solidFill>
+                  <a:srgbClr val="C00000"/>
+                </a:solidFill>
                 <a:latin typeface="Calibri" pitchFamily="34" charset="0"/>
                 <a:sym typeface="Wingdings"/>
               </a:rPr>
-              <a:t> </a:t>
-            </a:r>
-            <a:r>
-              <a:rPr lang="de-DE" sz="2400" b="1" dirty="0" smtClean="0">
-                <a:latin typeface="Calibri" pitchFamily="34" charset="0"/>
-                <a:sym typeface="Wingdings"/>
-              </a:rPr>
-              <a:t>?</a:t>
-            </a:r>
+              <a:t></a:t>
+            </a:r>
+            <a:endParaRPr lang="de-DE" sz="2400" b="1" dirty="0" smtClean="0">
+              <a:latin typeface="Calibri" pitchFamily="34" charset="0"/>
+              <a:sym typeface="Wingdings"/>
+            </a:endParaRPr>
           </a:p>
           <a:p>
             <a:pPr marL="355600" indent="-355600" algn="ctr">

</xml_diff>